<commit_message>
Spark Streaming, new figures
</commit_message>
<xml_diff>
--- a/Figures.pptx
+++ b/Figures.pptx
@@ -6,6 +6,7 @@
   </p:sldMasterIdLst>
   <p:sldIdLst>
     <p:sldId id="257" r:id="rId2"/>
+    <p:sldId id="258" r:id="rId3"/>
   </p:sldIdLst>
   <p:sldSz cx="12192000" cy="6858000"/>
   <p:notesSz cx="6858000" cy="9144000"/>
@@ -104,6 +105,11 @@
       </a:defRPr>
     </a:lvl9pPr>
   </p:defaultTextStyle>
+  <p:extLst>
+    <p:ext uri="{EFAFB233-063F-42B5-8137-9DF3F51BA10A}">
+      <p15:sldGuideLst xmlns:p15="http://schemas.microsoft.com/office/powerpoint/2012/main"/>
+    </p:ext>
+  </p:extLst>
 </p:presentation>
 </file>
 
@@ -1055,6 +1061,13 @@
         </dgm:presLayoutVars>
       </dgm:prSet>
       <dgm:spPr/>
+      <dgm:t>
+        <a:bodyPr/>
+        <a:lstStyle/>
+        <a:p>
+          <a:endParaRPr lang="en-US"/>
+        </a:p>
+      </dgm:t>
     </dgm:pt>
     <dgm:pt modelId="{13CF0485-F205-42E0-80B8-D72191A69208}" type="pres">
       <dgm:prSet presAssocID="{7BA8BC98-7AF8-4E66-A711-5725736FB7D9}" presName="vertOne" presStyleCnt="0"/>
@@ -1094,6 +1107,13 @@
         </dgm:presLayoutVars>
       </dgm:prSet>
       <dgm:spPr/>
+      <dgm:t>
+        <a:bodyPr/>
+        <a:lstStyle/>
+        <a:p>
+          <a:endParaRPr lang="en-US"/>
+        </a:p>
+      </dgm:t>
     </dgm:pt>
     <dgm:pt modelId="{4E800202-B56F-4DC7-BDD9-1681FCC603A7}" type="pres">
       <dgm:prSet presAssocID="{E9D3AC48-FD54-4C0C-AD44-BC6E6047C89C}" presName="parTransTwo" presStyleCnt="0"/>
@@ -1114,6 +1134,13 @@
         </dgm:presLayoutVars>
       </dgm:prSet>
       <dgm:spPr/>
+      <dgm:t>
+        <a:bodyPr/>
+        <a:lstStyle/>
+        <a:p>
+          <a:endParaRPr lang="en-US"/>
+        </a:p>
+      </dgm:t>
     </dgm:pt>
     <dgm:pt modelId="{E4F1BDBA-4ECC-4881-BEBA-5CFA31AC1D0C}" type="pres">
       <dgm:prSet presAssocID="{A398DADB-0F79-4AD2-A5C9-C96FDEDC2D73}" presName="parTransThree" presStyleCnt="0"/>
@@ -1152,15 +1179,15 @@
     </dgm:pt>
   </dgm:ptLst>
   <dgm:cxnLst>
+    <dgm:cxn modelId="{596A7BC1-4C5F-45C7-B74F-AEABE947AC31}" srcId="{A398DADB-0F79-4AD2-A5C9-C96FDEDC2D73}" destId="{0CEC93F0-20CA-4CD6-8394-6BC530E7D878}" srcOrd="0" destOrd="0" parTransId="{E7E66FAA-C4BC-48D2-BFEF-C79A67E50C3D}" sibTransId="{6CED0363-AF4F-4AFF-BA1C-69422B7AA794}"/>
+    <dgm:cxn modelId="{4F6DE695-23F3-4D9C-AF99-5CA1F2D5A61A}" type="presOf" srcId="{A398DADB-0F79-4AD2-A5C9-C96FDEDC2D73}" destId="{70572151-0882-4BFC-969B-F1034E5AA264}" srcOrd="0" destOrd="0" presId="urn:microsoft.com/office/officeart/2005/8/layout/architecture"/>
     <dgm:cxn modelId="{E7B9C1DC-6805-4321-949A-6FCFEF93827C}" srcId="{57338EDA-95CF-4B1E-ADAE-CD9AF63C2388}" destId="{7BA8BC98-7AF8-4E66-A711-5725736FB7D9}" srcOrd="0" destOrd="0" parTransId="{5F5D993A-7BB0-4E72-B4A3-85A003235DC0}" sibTransId="{1B164868-FC7A-4EAF-A4AD-F95180469070}"/>
+    <dgm:cxn modelId="{153CDF2E-A7DF-469B-B583-4433EB967BE6}" type="presOf" srcId="{7BA8BC98-7AF8-4E66-A711-5725736FB7D9}" destId="{F7FA89BF-0FD0-4ECA-A037-E04F9894C8C4}" srcOrd="0" destOrd="0" presId="urn:microsoft.com/office/officeart/2005/8/layout/architecture"/>
+    <dgm:cxn modelId="{7E5BFE61-4302-4D1D-A047-6D5EDA64214E}" srcId="{7BA8BC98-7AF8-4E66-A711-5725736FB7D9}" destId="{E9D3AC48-FD54-4C0C-AD44-BC6E6047C89C}" srcOrd="0" destOrd="0" parTransId="{B7A90B14-1C05-4629-A797-13C48E2E23C4}" sibTransId="{7B9D4301-1888-4DF6-8860-B3A35A1BEE4D}"/>
+    <dgm:cxn modelId="{47D48BF0-6214-48D4-8A13-9514EAC4716B}" type="presOf" srcId="{57338EDA-95CF-4B1E-ADAE-CD9AF63C2388}" destId="{4323EBC6-737A-48C1-9A1B-4A8E68EBD340}" srcOrd="0" destOrd="0" presId="urn:microsoft.com/office/officeart/2005/8/layout/architecture"/>
     <dgm:cxn modelId="{2A257F27-232E-49FA-840C-64CB5CECCB2A}" type="presOf" srcId="{E9D3AC48-FD54-4C0C-AD44-BC6E6047C89C}" destId="{428010A3-E951-4D6A-B71F-8247957CB2CF}" srcOrd="0" destOrd="0" presId="urn:microsoft.com/office/officeart/2005/8/layout/architecture"/>
     <dgm:cxn modelId="{FFB06DD9-85BE-4805-9BFF-331399A47EA6}" type="presOf" srcId="{0CEC93F0-20CA-4CD6-8394-6BC530E7D878}" destId="{B28A3B46-99F3-4EAE-BCDE-D0748757AF00}" srcOrd="0" destOrd="0" presId="urn:microsoft.com/office/officeart/2005/8/layout/architecture"/>
     <dgm:cxn modelId="{E61BCE78-9C27-47D1-B483-CEFB18728DE5}" srcId="{E9D3AC48-FD54-4C0C-AD44-BC6E6047C89C}" destId="{A398DADB-0F79-4AD2-A5C9-C96FDEDC2D73}" srcOrd="0" destOrd="0" parTransId="{7AE9D26C-CEB7-433F-B7D2-B893F62176E8}" sibTransId="{4C8984DB-B85C-46AF-B86C-A6D8DCC5D348}"/>
-    <dgm:cxn modelId="{7E5BFE61-4302-4D1D-A047-6D5EDA64214E}" srcId="{7BA8BC98-7AF8-4E66-A711-5725736FB7D9}" destId="{E9D3AC48-FD54-4C0C-AD44-BC6E6047C89C}" srcOrd="0" destOrd="0" parTransId="{B7A90B14-1C05-4629-A797-13C48E2E23C4}" sibTransId="{7B9D4301-1888-4DF6-8860-B3A35A1BEE4D}"/>
-    <dgm:cxn modelId="{153CDF2E-A7DF-469B-B583-4433EB967BE6}" type="presOf" srcId="{7BA8BC98-7AF8-4E66-A711-5725736FB7D9}" destId="{F7FA89BF-0FD0-4ECA-A037-E04F9894C8C4}" srcOrd="0" destOrd="0" presId="urn:microsoft.com/office/officeart/2005/8/layout/architecture"/>
-    <dgm:cxn modelId="{596A7BC1-4C5F-45C7-B74F-AEABE947AC31}" srcId="{A398DADB-0F79-4AD2-A5C9-C96FDEDC2D73}" destId="{0CEC93F0-20CA-4CD6-8394-6BC530E7D878}" srcOrd="0" destOrd="0" parTransId="{E7E66FAA-C4BC-48D2-BFEF-C79A67E50C3D}" sibTransId="{6CED0363-AF4F-4AFF-BA1C-69422B7AA794}"/>
-    <dgm:cxn modelId="{47D48BF0-6214-48D4-8A13-9514EAC4716B}" type="presOf" srcId="{57338EDA-95CF-4B1E-ADAE-CD9AF63C2388}" destId="{4323EBC6-737A-48C1-9A1B-4A8E68EBD340}" srcOrd="0" destOrd="0" presId="urn:microsoft.com/office/officeart/2005/8/layout/architecture"/>
-    <dgm:cxn modelId="{4F6DE695-23F3-4D9C-AF99-5CA1F2D5A61A}" type="presOf" srcId="{A398DADB-0F79-4AD2-A5C9-C96FDEDC2D73}" destId="{70572151-0882-4BFC-969B-F1034E5AA264}" srcOrd="0" destOrd="0" presId="urn:microsoft.com/office/officeart/2005/8/layout/architecture"/>
     <dgm:cxn modelId="{BC2E0C3D-AEE6-4968-BC2B-AC4FED457E86}" type="presParOf" srcId="{4323EBC6-737A-48C1-9A1B-4A8E68EBD340}" destId="{13CF0485-F205-42E0-80B8-D72191A69208}" srcOrd="0" destOrd="0" presId="urn:microsoft.com/office/officeart/2005/8/layout/architecture"/>
     <dgm:cxn modelId="{9CFB80EA-6579-48DB-9662-EBCB9CB9694F}" type="presParOf" srcId="{13CF0485-F205-42E0-80B8-D72191A69208}" destId="{F7FA89BF-0FD0-4ECA-A037-E04F9894C8C4}" srcOrd="0" destOrd="0" presId="urn:microsoft.com/office/officeart/2005/8/layout/architecture"/>
     <dgm:cxn modelId="{D6B4DD8D-3C59-495F-96B2-B9A303A246EC}" type="presParOf" srcId="{13CF0485-F205-42E0-80B8-D72191A69208}" destId="{A61CB5DF-6F36-44AB-B65F-E67D7DD87AE1}" srcOrd="1" destOrd="0" presId="urn:microsoft.com/office/officeart/2005/8/layout/architecture"/>
@@ -3223,7 +3250,7 @@
           <a:p>
             <a:fld id="{B26FA5D4-0961-4AEE-B603-5A3B1DB4BBA9}" type="datetimeFigureOut">
               <a:rPr lang="en-US" smtClean="0"/>
-              <a:t>6/26/2016</a:t>
+              <a:t>6/27/2016</a:t>
             </a:fld>
             <a:endParaRPr lang="en-US"/>
           </a:p>
@@ -3393,7 +3420,7 @@
           <a:p>
             <a:fld id="{B26FA5D4-0961-4AEE-B603-5A3B1DB4BBA9}" type="datetimeFigureOut">
               <a:rPr lang="en-US" smtClean="0"/>
-              <a:t>6/26/2016</a:t>
+              <a:t>6/27/2016</a:t>
             </a:fld>
             <a:endParaRPr lang="en-US"/>
           </a:p>
@@ -3573,7 +3600,7 @@
           <a:p>
             <a:fld id="{B26FA5D4-0961-4AEE-B603-5A3B1DB4BBA9}" type="datetimeFigureOut">
               <a:rPr lang="en-US" smtClean="0"/>
-              <a:t>6/26/2016</a:t>
+              <a:t>6/27/2016</a:t>
             </a:fld>
             <a:endParaRPr lang="en-US"/>
           </a:p>
@@ -3743,7 +3770,7 @@
           <a:p>
             <a:fld id="{B26FA5D4-0961-4AEE-B603-5A3B1DB4BBA9}" type="datetimeFigureOut">
               <a:rPr lang="en-US" smtClean="0"/>
-              <a:t>6/26/2016</a:t>
+              <a:t>6/27/2016</a:t>
             </a:fld>
             <a:endParaRPr lang="en-US"/>
           </a:p>
@@ -3989,7 +4016,7 @@
           <a:p>
             <a:fld id="{B26FA5D4-0961-4AEE-B603-5A3B1DB4BBA9}" type="datetimeFigureOut">
               <a:rPr lang="en-US" smtClean="0"/>
-              <a:t>6/26/2016</a:t>
+              <a:t>6/27/2016</a:t>
             </a:fld>
             <a:endParaRPr lang="en-US"/>
           </a:p>
@@ -4221,7 +4248,7 @@
           <a:p>
             <a:fld id="{B26FA5D4-0961-4AEE-B603-5A3B1DB4BBA9}" type="datetimeFigureOut">
               <a:rPr lang="en-US" smtClean="0"/>
-              <a:t>6/26/2016</a:t>
+              <a:t>6/27/2016</a:t>
             </a:fld>
             <a:endParaRPr lang="en-US"/>
           </a:p>
@@ -4588,7 +4615,7 @@
           <a:p>
             <a:fld id="{B26FA5D4-0961-4AEE-B603-5A3B1DB4BBA9}" type="datetimeFigureOut">
               <a:rPr lang="en-US" smtClean="0"/>
-              <a:t>6/26/2016</a:t>
+              <a:t>6/27/2016</a:t>
             </a:fld>
             <a:endParaRPr lang="en-US"/>
           </a:p>
@@ -4706,7 +4733,7 @@
           <a:p>
             <a:fld id="{B26FA5D4-0961-4AEE-B603-5A3B1DB4BBA9}" type="datetimeFigureOut">
               <a:rPr lang="en-US" smtClean="0"/>
-              <a:t>6/26/2016</a:t>
+              <a:t>6/27/2016</a:t>
             </a:fld>
             <a:endParaRPr lang="en-US"/>
           </a:p>
@@ -4801,7 +4828,7 @@
           <a:p>
             <a:fld id="{B26FA5D4-0961-4AEE-B603-5A3B1DB4BBA9}" type="datetimeFigureOut">
               <a:rPr lang="en-US" smtClean="0"/>
-              <a:t>6/26/2016</a:t>
+              <a:t>6/27/2016</a:t>
             </a:fld>
             <a:endParaRPr lang="en-US"/>
           </a:p>
@@ -5078,7 +5105,7 @@
           <a:p>
             <a:fld id="{B26FA5D4-0961-4AEE-B603-5A3B1DB4BBA9}" type="datetimeFigureOut">
               <a:rPr lang="en-US" smtClean="0"/>
-              <a:t>6/26/2016</a:t>
+              <a:t>6/27/2016</a:t>
             </a:fld>
             <a:endParaRPr lang="en-US"/>
           </a:p>
@@ -5331,7 +5358,7 @@
           <a:p>
             <a:fld id="{B26FA5D4-0961-4AEE-B603-5A3B1DB4BBA9}" type="datetimeFigureOut">
               <a:rPr lang="en-US" smtClean="0"/>
-              <a:t>6/26/2016</a:t>
+              <a:t>6/27/2016</a:t>
             </a:fld>
             <a:endParaRPr lang="en-US"/>
           </a:p>
@@ -5544,7 +5571,7 @@
           <a:p>
             <a:fld id="{B26FA5D4-0961-4AEE-B603-5A3B1DB4BBA9}" type="datetimeFigureOut">
               <a:rPr lang="en-US" smtClean="0"/>
-              <a:t>6/26/2016</a:t>
+              <a:t>6/27/2016</a:t>
             </a:fld>
             <a:endParaRPr lang="en-US"/>
           </a:p>
@@ -6090,6 +6117,250 @@
 </p:sld>
 </file>
 
+<file path=ppt/slides/slide2.xml><?xml version="1.0" encoding="utf-8"?>
+<p:sld xmlns:a="http://schemas.openxmlformats.org/drawingml/2006/main" xmlns:r="http://schemas.openxmlformats.org/officeDocument/2006/relationships" xmlns:p="http://schemas.openxmlformats.org/presentationml/2006/main">
+  <p:cSld>
+    <p:spTree>
+      <p:nvGrpSpPr>
+        <p:cNvPr id="1" name=""/>
+        <p:cNvGrpSpPr/>
+        <p:nvPr/>
+      </p:nvGrpSpPr>
+      <p:grpSpPr>
+        <a:xfrm>
+          <a:off x="0" y="0"/>
+          <a:ext cx="0" cy="0"/>
+          <a:chOff x="0" y="0"/>
+          <a:chExt cx="0" cy="0"/>
+        </a:xfrm>
+      </p:grpSpPr>
+      <p:pic>
+        <p:nvPicPr>
+          <p:cNvPr id="4" name="Content Placeholder 3"/>
+          <p:cNvPicPr>
+            <a:picLocks noGrp="1" noChangeAspect="1"/>
+          </p:cNvPicPr>
+          <p:nvPr>
+            <p:ph idx="1"/>
+          </p:nvPr>
+        </p:nvPicPr>
+        <p:blipFill>
+          <a:blip r:embed="rId2">
+            <a:extLst>
+              <a:ext uri="{28A0092B-C50C-407E-A947-70E740481C1C}">
+                <a14:useLocalDpi xmlns:a14="http://schemas.microsoft.com/office/drawing/2010/main" val="0"/>
+              </a:ext>
+            </a:extLst>
+          </a:blip>
+          <a:stretch>
+            <a:fillRect/>
+          </a:stretch>
+        </p:blipFill>
+        <p:spPr>
+          <a:xfrm>
+            <a:off x="639415" y="2129246"/>
+            <a:ext cx="11418958" cy="2548209"/>
+          </a:xfrm>
+        </p:spPr>
+      </p:pic>
+      <p:sp>
+        <p:nvSpPr>
+          <p:cNvPr id="6" name="TextBox 5"/>
+          <p:cNvSpPr txBox="1"/>
+          <p:nvPr/>
+        </p:nvSpPr>
+        <p:spPr>
+          <a:xfrm>
+            <a:off x="1045028" y="2541200"/>
+            <a:ext cx="1489165" cy="830997"/>
+          </a:xfrm>
+          <a:prstGeom prst="rect">
+            <a:avLst/>
+          </a:prstGeom>
+          <a:solidFill>
+            <a:schemeClr val="bg1"/>
+          </a:solidFill>
+        </p:spPr>
+        <p:txBody>
+          <a:bodyPr wrap="square" rtlCol="0">
+            <a:spAutoFit/>
+          </a:bodyPr>
+          <a:lstStyle/>
+          <a:p>
+            <a:pPr algn="ctr"/>
+            <a:r>
+              <a:rPr lang="fa-IR" sz="2400" b="1" dirty="0" smtClean="0">
+                <a:cs typeface="B Nazanin" panose="00000400000000000000" pitchFamily="2" charset="-78"/>
+              </a:rPr>
+              <a:t>جریان‌داده‌ی ورودی</a:t>
+            </a:r>
+            <a:endParaRPr lang="en-US" sz="2400" b="1" dirty="0">
+              <a:cs typeface="B Nazanin" panose="00000400000000000000" pitchFamily="2" charset="-78"/>
+            </a:endParaRPr>
+          </a:p>
+        </p:txBody>
+      </p:sp>
+      <p:sp>
+        <p:nvSpPr>
+          <p:cNvPr id="7" name="TextBox 6"/>
+          <p:cNvSpPr txBox="1"/>
+          <p:nvPr/>
+        </p:nvSpPr>
+        <p:spPr>
+          <a:xfrm>
+            <a:off x="2992057" y="2968869"/>
+            <a:ext cx="1997954" cy="1077218"/>
+          </a:xfrm>
+          <a:prstGeom prst="rect">
+            <a:avLst/>
+          </a:prstGeom>
+          <a:solidFill>
+            <a:schemeClr val="bg1"/>
+          </a:solidFill>
+        </p:spPr>
+        <p:txBody>
+          <a:bodyPr wrap="square" rtlCol="0">
+            <a:spAutoFit/>
+          </a:bodyPr>
+          <a:lstStyle/>
+          <a:p>
+            <a:pPr algn="ctr" rtl="1"/>
+            <a:r>
+              <a:rPr lang="fa-IR" sz="3200" b="1" dirty="0" smtClean="0">
+                <a:cs typeface="B Nazanin" panose="00000400000000000000" pitchFamily="2" charset="-78"/>
+              </a:rPr>
+              <a:t>اسپارک استریمینگ</a:t>
+            </a:r>
+            <a:endParaRPr lang="en-US" sz="3200" b="1" dirty="0">
+              <a:cs typeface="B Nazanin" panose="00000400000000000000" pitchFamily="2" charset="-78"/>
+            </a:endParaRPr>
+          </a:p>
+        </p:txBody>
+      </p:sp>
+      <p:sp>
+        <p:nvSpPr>
+          <p:cNvPr id="8" name="TextBox 7"/>
+          <p:cNvSpPr txBox="1"/>
+          <p:nvPr/>
+        </p:nvSpPr>
+        <p:spPr>
+          <a:xfrm>
+            <a:off x="5238206" y="2534197"/>
+            <a:ext cx="1828800" cy="830997"/>
+          </a:xfrm>
+          <a:prstGeom prst="rect">
+            <a:avLst/>
+          </a:prstGeom>
+          <a:solidFill>
+            <a:schemeClr val="bg1"/>
+          </a:solidFill>
+        </p:spPr>
+        <p:txBody>
+          <a:bodyPr wrap="square" rtlCol="0">
+            <a:spAutoFit/>
+          </a:bodyPr>
+          <a:lstStyle/>
+          <a:p>
+            <a:pPr algn="ctr"/>
+            <a:r>
+              <a:rPr lang="fa-IR" sz="2400" b="1" dirty="0" smtClean="0">
+                <a:cs typeface="B Nazanin" panose="00000400000000000000" pitchFamily="2" charset="-78"/>
+              </a:rPr>
+              <a:t>دسته‌های داده‌های ورودی</a:t>
+            </a:r>
+            <a:endParaRPr lang="en-US" sz="2400" b="1" dirty="0">
+              <a:cs typeface="B Nazanin" panose="00000400000000000000" pitchFamily="2" charset="-78"/>
+            </a:endParaRPr>
+          </a:p>
+        </p:txBody>
+      </p:sp>
+      <p:sp>
+        <p:nvSpPr>
+          <p:cNvPr id="9" name="TextBox 8"/>
+          <p:cNvSpPr txBox="1"/>
+          <p:nvPr/>
+        </p:nvSpPr>
+        <p:spPr>
+          <a:xfrm>
+            <a:off x="7315201" y="2970849"/>
+            <a:ext cx="1723633" cy="1077218"/>
+          </a:xfrm>
+          <a:prstGeom prst="rect">
+            <a:avLst/>
+          </a:prstGeom>
+          <a:solidFill>
+            <a:schemeClr val="bg1"/>
+          </a:solidFill>
+        </p:spPr>
+        <p:txBody>
+          <a:bodyPr wrap="square" rtlCol="0">
+            <a:spAutoFit/>
+          </a:bodyPr>
+          <a:lstStyle/>
+          <a:p>
+            <a:pPr algn="ctr" rtl="1"/>
+            <a:r>
+              <a:rPr lang="fa-IR" sz="3200" b="1" dirty="0" smtClean="0">
+                <a:cs typeface="B Nazanin" panose="00000400000000000000" pitchFamily="2" charset="-78"/>
+              </a:rPr>
+              <a:t>موتور اسپارک</a:t>
+            </a:r>
+            <a:endParaRPr lang="en-US" sz="3200" b="1" dirty="0">
+              <a:cs typeface="B Nazanin" panose="00000400000000000000" pitchFamily="2" charset="-78"/>
+            </a:endParaRPr>
+          </a:p>
+        </p:txBody>
+      </p:sp>
+      <p:sp>
+        <p:nvSpPr>
+          <p:cNvPr id="10" name="TextBox 9"/>
+          <p:cNvSpPr txBox="1"/>
+          <p:nvPr/>
+        </p:nvSpPr>
+        <p:spPr>
+          <a:xfrm>
+            <a:off x="9222861" y="2588395"/>
+            <a:ext cx="2215160" cy="830997"/>
+          </a:xfrm>
+          <a:prstGeom prst="rect">
+            <a:avLst/>
+          </a:prstGeom>
+          <a:solidFill>
+            <a:schemeClr val="bg1"/>
+          </a:solidFill>
+        </p:spPr>
+        <p:txBody>
+          <a:bodyPr wrap="square" rtlCol="0">
+            <a:spAutoFit/>
+          </a:bodyPr>
+          <a:lstStyle/>
+          <a:p>
+            <a:pPr algn="ctr" rtl="1"/>
+            <a:r>
+              <a:rPr lang="fa-IR" sz="2400" b="1" dirty="0" smtClean="0">
+                <a:cs typeface="B Nazanin" panose="00000400000000000000" pitchFamily="2" charset="-78"/>
+              </a:rPr>
+              <a:t>دسته‌های داده‌های پردازش‌شده</a:t>
+            </a:r>
+            <a:endParaRPr lang="en-US" sz="2400" b="1" dirty="0">
+              <a:cs typeface="B Nazanin" panose="00000400000000000000" pitchFamily="2" charset="-78"/>
+            </a:endParaRPr>
+          </a:p>
+        </p:txBody>
+      </p:sp>
+    </p:spTree>
+    <p:extLst>
+      <p:ext uri="{BB962C8B-B14F-4D97-AF65-F5344CB8AC3E}">
+        <p14:creationId xmlns:p14="http://schemas.microsoft.com/office/powerpoint/2010/main" val="1316890103"/>
+      </p:ext>
+    </p:extLst>
+  </p:cSld>
+  <p:clrMapOvr>
+    <a:masterClrMapping/>
+  </p:clrMapOvr>
+</p:sld>
+</file>
+
 <file path=ppt/theme/theme1.xml><?xml version="1.0" encoding="utf-8"?>
 <a:theme xmlns:a="http://schemas.openxmlformats.org/drawingml/2006/main" name="Office Theme">
   <a:themeElements>

</xml_diff>

<commit_message>
Review until chapter 3
</commit_message>
<xml_diff>
--- a/Figures.pptx
+++ b/Figures.pptx
@@ -1713,7 +1713,7 @@
             <a:rPr lang="fa-IR" b="1" dirty="0" smtClean="0">
               <a:cs typeface="B Nazanin" panose="00000400000000000000" pitchFamily="2" charset="-78"/>
             </a:rPr>
-            <a:t>گره‌های اجرایی</a:t>
+            <a:t>طرح اجرایی</a:t>
           </a:r>
           <a:endParaRPr lang="en-US" b="1" dirty="0">
             <a:cs typeface="B Nazanin" panose="00000400000000000000" pitchFamily="2" charset="-78"/>
@@ -1757,7 +1757,7 @@
             <a:rPr lang="fa-IR" b="1" dirty="0" smtClean="0">
               <a:cs typeface="B Nazanin" panose="00000400000000000000" pitchFamily="2" charset="-78"/>
             </a:rPr>
-            <a:t>گراف اجرا</a:t>
+            <a:t>طرح منطقی</a:t>
           </a:r>
           <a:endParaRPr lang="en-US" b="1" dirty="0">
             <a:cs typeface="B Nazanin" panose="00000400000000000000" pitchFamily="2" charset="-78"/>
@@ -2564,7 +2564,7 @@
             <a:rPr lang="fa-IR" sz="3000" b="1" kern="1200" dirty="0" smtClean="0">
               <a:cs typeface="B Nazanin" panose="00000400000000000000" pitchFamily="2" charset="-78"/>
             </a:rPr>
-            <a:t>گره‌های اجرایی</a:t>
+            <a:t>طرح اجرایی</a:t>
           </a:r>
           <a:endParaRPr lang="en-US" sz="3000" b="1" kern="1200" dirty="0">
             <a:cs typeface="B Nazanin" panose="00000400000000000000" pitchFamily="2" charset="-78"/>
@@ -2648,7 +2648,7 @@
             <a:rPr lang="fa-IR" sz="3000" b="1" kern="1200" dirty="0" smtClean="0">
               <a:cs typeface="B Nazanin" panose="00000400000000000000" pitchFamily="2" charset="-78"/>
             </a:rPr>
-            <a:t>گراف اجرا</a:t>
+            <a:t>طرح منطقی</a:t>
           </a:r>
           <a:endParaRPr lang="en-US" sz="3000" b="1" kern="1200" dirty="0">
             <a:cs typeface="B Nazanin" panose="00000400000000000000" pitchFamily="2" charset="-78"/>
@@ -9146,7 +9146,7 @@
             <p:ph idx="1"/>
             <p:extLst>
               <p:ext uri="{D42A27DB-BD31-4B8C-83A1-F6EECF244321}">
-                <p14:modId xmlns:p14="http://schemas.microsoft.com/office/powerpoint/2010/main" val="4234431446"/>
+                <p14:modId xmlns:p14="http://schemas.microsoft.com/office/powerpoint/2010/main" val="3045471393"/>
               </p:ext>
             </p:extLst>
           </p:nvPr>

</xml_diff>